<commit_message>
add TCDNUG for Database Devops
</commit_message>
<xml_diff>
--- a/2022-05-11-NDCLondon-DatabaseDevOps/database-devops.pptx
+++ b/2022-05-11-NDCLondon-DatabaseDevOps/database-devops.pptx
@@ -587,13 +587,8 @@
           <a:p>
             <a:r>
               <a:rPr lang="en-US" dirty="0"/>
-              <a:t>Try to connect to Postgres Azure DBs to make </a:t>
+              <a:t>Try to connect to Postgres Azure DBs to make sure that’s good</a:t>
             </a:r>
-            <a:r>
-              <a:rPr lang="en-US"/>
-              <a:t>sure that’s good</a:t>
-            </a:r>
-            <a:endParaRPr lang="en-US" dirty="0"/>
           </a:p>
           <a:p>
             <a:r>

</xml_diff>